<commit_message>
Updating Hands On for Day 14.
</commit_message>
<xml_diff>
--- a/Day 14/Slides/5. Mapping Services Using Intelligent Routing/mapping-services-using-intelligent-routing-slides.pptx
+++ b/Day 14/Slides/5. Mapping Services Using Intelligent Routing/mapping-services-using-intelligent-routing-slides.pptx
@@ -8113,7 +8113,7 @@
         <p:spPr>
           <a:xfrm>
             <a:off x="7461504" y="2171700"/>
-            <a:ext cx="4243070" cy="3503929"/>
+            <a:ext cx="4243070" cy="2650490"/>
           </a:xfrm>
           <a:prstGeom prst="rect">
             <a:avLst/>
@@ -8139,27 +8139,6 @@
             <a:endParaRPr sz="2950">
               <a:latin typeface="Times New Roman" panose="02020603050405020304"/>
               <a:cs typeface="Times New Roman" panose="02020603050405020304"/>
-            </a:endParaRPr>
-          </a:p>
-          <a:p>
-            <a:pPr marR="3684905" algn="r">
-              <a:lnSpc>
-                <a:spcPct val="100000"/>
-              </a:lnSpc>
-            </a:pPr>
-            <a:r>
-              <a:rPr sz="1800" spc="-5" dirty="0">
-                <a:solidFill>
-                  <a:srgbClr val="00B050"/>
-                </a:solidFill>
-                <a:latin typeface="Courier New" panose="02070309020205020404"/>
-                <a:cs typeface="Courier New" panose="02070309020205020404"/>
-              </a:rPr>
-              <a:t>sp</a:t>
-            </a:r>
-            <a:endParaRPr sz="1800">
-              <a:latin typeface="Courier New" panose="02070309020205020404"/>
-              <a:cs typeface="Courier New" panose="02070309020205020404"/>
             </a:endParaRPr>
           </a:p>
           <a:p>
@@ -8251,8 +8230,8 @@
         </p:nvSpPr>
         <p:spPr>
           <a:xfrm>
-            <a:off x="8011730" y="2597748"/>
-            <a:ext cx="3415665" cy="2639695"/>
+            <a:off x="7467600" y="2213610"/>
+            <a:ext cx="4632960" cy="2637790"/>
           </a:xfrm>
           <a:prstGeom prst="rect">
             <a:avLst/>
@@ -8273,6 +8252,17 @@
               </a:spcBef>
             </a:pPr>
             <a:r>
+              <a:rPr spc="-5" dirty="0">
+                <a:solidFill>
+                  <a:srgbClr val="00B050"/>
+                </a:solidFill>
+                <a:latin typeface="Courier New" panose="02070309020205020404"/>
+                <a:cs typeface="Courier New" panose="02070309020205020404"/>
+                <a:sym typeface="+mn-ea"/>
+              </a:rPr>
+              <a:t>sp</a:t>
+            </a:r>
+            <a:r>
               <a:rPr sz="1800" spc="-10" dirty="0">
                 <a:solidFill>
                   <a:srgbClr val="00B050"/>
@@ -8292,7 +8282,10 @@
               </a:rPr>
               <a:t>foo</a:t>
             </a:r>
-            <a:endParaRPr sz="1800">
+            <a:endParaRPr sz="1800" spc="-10" dirty="0">
+              <a:solidFill>
+                <a:srgbClr val="3E3E3E"/>
+              </a:solidFill>
               <a:latin typeface="Courier New" panose="02070309020205020404"/>
               <a:cs typeface="Courier New" panose="02070309020205020404"/>
             </a:endParaRPr>
@@ -8302,8 +8295,11 @@
               <a:lnSpc>
                 <a:spcPct val="100000"/>
               </a:lnSpc>
+              <a:spcBef>
+                <a:spcPts val="85"/>
+              </a:spcBef>
             </a:pPr>
-            <a:endParaRPr sz="2300">
+            <a:endParaRPr sz="1800">
               <a:latin typeface="Courier New" panose="02070309020205020404"/>
               <a:cs typeface="Courier New" panose="02070309020205020404"/>
             </a:endParaRPr>
@@ -8364,6 +8360,16 @@
               </a:spcBef>
             </a:pPr>
             <a:r>
+              <a:rPr lang="en-US" sz="1800" spc="-10" dirty="0">
+                <a:solidFill>
+                  <a:srgbClr val="00B050"/>
+                </a:solidFill>
+                <a:latin typeface="Courier New" panose="02070309020205020404"/>
+                <a:cs typeface="Courier New" panose="02070309020205020404"/>
+              </a:rPr>
+              <a:t>s</a:t>
+            </a:r>
+            <a:r>
               <a:rPr sz="1800" spc="-10" dirty="0">
                 <a:solidFill>
                   <a:srgbClr val="00B050"/>
@@ -8382,6 +8388,16 @@
                 <a:cs typeface="Courier New" panose="02070309020205020404"/>
               </a:rPr>
               <a:t> </a:t>
+            </a:r>
+            <a:r>
+              <a:rPr lang="en-US" sz="1800" spc="-1070" dirty="0">
+                <a:solidFill>
+                  <a:srgbClr val="00B050"/>
+                </a:solidFill>
+                <a:latin typeface="Courier New" panose="02070309020205020404"/>
+                <a:cs typeface="Courier New" panose="02070309020205020404"/>
+              </a:rPr>
+              <a:t>                        </a:t>
             </a:r>
             <a:r>
               <a:rPr sz="1800" spc="-10" dirty="0">
@@ -9683,54 +9699,6 @@
               <a:cs typeface="Verdana" panose="020B0604030504040204"/>
             </a:endParaRPr>
           </a:p>
-        </p:txBody>
-      </p:sp>
-      <p:sp>
-        <p:nvSpPr>
-          <p:cNvPr id="16" name="object 16"/>
-          <p:cNvSpPr/>
-          <p:nvPr/>
-        </p:nvSpPr>
-        <p:spPr>
-          <a:xfrm>
-            <a:off x="701040" y="2179320"/>
-            <a:ext cx="3429000" cy="3496310"/>
-          </a:xfrm>
-          <a:custGeom>
-            <a:avLst/>
-            <a:gdLst/>
-            <a:ahLst/>
-            <a:cxnLst/>
-            <a:rect l="l" t="t" r="r" b="b"/>
-            <a:pathLst>
-              <a:path w="3429000" h="3496310">
-                <a:moveTo>
-                  <a:pt x="3429000" y="0"/>
-                </a:moveTo>
-                <a:lnTo>
-                  <a:pt x="0" y="0"/>
-                </a:lnTo>
-                <a:lnTo>
-                  <a:pt x="0" y="3496055"/>
-                </a:lnTo>
-                <a:lnTo>
-                  <a:pt x="3429000" y="3496055"/>
-                </a:lnTo>
-                <a:lnTo>
-                  <a:pt x="3429000" y="0"/>
-                </a:lnTo>
-                <a:close/>
-              </a:path>
-            </a:pathLst>
-          </a:custGeom>
-          <a:solidFill>
-            <a:srgbClr val="E6E6E6"/>
-          </a:solidFill>
-        </p:spPr>
-        <p:txBody>
-          <a:bodyPr wrap="square" lIns="0" tIns="0" rIns="0" bIns="0" rtlCol="0"/>
-          <a:lstStyle/>
-          <a:p/>
         </p:txBody>
       </p:sp>
       <p:sp>

</xml_diff>